<commit_message>
API service endpoint completed
</commit_message>
<xml_diff>
--- a/docs/IIT_Conclave4_Architecture.pptx
+++ b/docs/IIT_Conclave4_Architecture.pptx
@@ -261,7 +261,7 @@
           <a:p>
             <a:fld id="{FFBB9753-AEB5-45D8-879D-9D94C63F33B9}" type="datetimeFigureOut">
               <a:rPr lang="en-IN" smtClean="0"/>
-              <a:t>17-01-2026</a:t>
+              <a:t>18-01-2026</a:t>
             </a:fld>
             <a:endParaRPr lang="en-IN"/>
           </a:p>
@@ -461,7 +461,7 @@
           <a:p>
             <a:fld id="{FFBB9753-AEB5-45D8-879D-9D94C63F33B9}" type="datetimeFigureOut">
               <a:rPr lang="en-IN" smtClean="0"/>
-              <a:t>17-01-2026</a:t>
+              <a:t>18-01-2026</a:t>
             </a:fld>
             <a:endParaRPr lang="en-IN"/>
           </a:p>
@@ -671,7 +671,7 @@
           <a:p>
             <a:fld id="{FFBB9753-AEB5-45D8-879D-9D94C63F33B9}" type="datetimeFigureOut">
               <a:rPr lang="en-IN" smtClean="0"/>
-              <a:t>17-01-2026</a:t>
+              <a:t>18-01-2026</a:t>
             </a:fld>
             <a:endParaRPr lang="en-IN"/>
           </a:p>
@@ -871,7 +871,7 @@
           <a:p>
             <a:fld id="{FFBB9753-AEB5-45D8-879D-9D94C63F33B9}" type="datetimeFigureOut">
               <a:rPr lang="en-IN" smtClean="0"/>
-              <a:t>17-01-2026</a:t>
+              <a:t>18-01-2026</a:t>
             </a:fld>
             <a:endParaRPr lang="en-IN"/>
           </a:p>
@@ -1147,7 +1147,7 @@
           <a:p>
             <a:fld id="{FFBB9753-AEB5-45D8-879D-9D94C63F33B9}" type="datetimeFigureOut">
               <a:rPr lang="en-IN" smtClean="0"/>
-              <a:t>17-01-2026</a:t>
+              <a:t>18-01-2026</a:t>
             </a:fld>
             <a:endParaRPr lang="en-IN"/>
           </a:p>
@@ -1415,7 +1415,7 @@
           <a:p>
             <a:fld id="{FFBB9753-AEB5-45D8-879D-9D94C63F33B9}" type="datetimeFigureOut">
               <a:rPr lang="en-IN" smtClean="0"/>
-              <a:t>17-01-2026</a:t>
+              <a:t>18-01-2026</a:t>
             </a:fld>
             <a:endParaRPr lang="en-IN"/>
           </a:p>
@@ -1830,7 +1830,7 @@
           <a:p>
             <a:fld id="{FFBB9753-AEB5-45D8-879D-9D94C63F33B9}" type="datetimeFigureOut">
               <a:rPr lang="en-IN" smtClean="0"/>
-              <a:t>17-01-2026</a:t>
+              <a:t>18-01-2026</a:t>
             </a:fld>
             <a:endParaRPr lang="en-IN"/>
           </a:p>
@@ -1972,7 +1972,7 @@
           <a:p>
             <a:fld id="{FFBB9753-AEB5-45D8-879D-9D94C63F33B9}" type="datetimeFigureOut">
               <a:rPr lang="en-IN" smtClean="0"/>
-              <a:t>17-01-2026</a:t>
+              <a:t>18-01-2026</a:t>
             </a:fld>
             <a:endParaRPr lang="en-IN"/>
           </a:p>
@@ -2085,7 +2085,7 @@
           <a:p>
             <a:fld id="{FFBB9753-AEB5-45D8-879D-9D94C63F33B9}" type="datetimeFigureOut">
               <a:rPr lang="en-IN" smtClean="0"/>
-              <a:t>17-01-2026</a:t>
+              <a:t>18-01-2026</a:t>
             </a:fld>
             <a:endParaRPr lang="en-IN"/>
           </a:p>
@@ -2398,7 +2398,7 @@
           <a:p>
             <a:fld id="{FFBB9753-AEB5-45D8-879D-9D94C63F33B9}" type="datetimeFigureOut">
               <a:rPr lang="en-IN" smtClean="0"/>
-              <a:t>17-01-2026</a:t>
+              <a:t>18-01-2026</a:t>
             </a:fld>
             <a:endParaRPr lang="en-IN"/>
           </a:p>
@@ -2687,7 +2687,7 @@
           <a:p>
             <a:fld id="{FFBB9753-AEB5-45D8-879D-9D94C63F33B9}" type="datetimeFigureOut">
               <a:rPr lang="en-IN" smtClean="0"/>
-              <a:t>17-01-2026</a:t>
+              <a:t>18-01-2026</a:t>
             </a:fld>
             <a:endParaRPr lang="en-IN"/>
           </a:p>
@@ -2930,7 +2930,7 @@
           <a:p>
             <a:fld id="{FFBB9753-AEB5-45D8-879D-9D94C63F33B9}" type="datetimeFigureOut">
               <a:rPr lang="en-IN" smtClean="0"/>
-              <a:t>17-01-2026</a:t>
+              <a:t>18-01-2026</a:t>
             </a:fld>
             <a:endParaRPr lang="en-IN"/>
           </a:p>
@@ -5358,7 +5358,7 @@
         <p:spPr>
           <a:xfrm>
             <a:off x="9557766" y="3913361"/>
-            <a:ext cx="1620957" cy="246221"/>
+            <a:ext cx="1617751" cy="246221"/>
           </a:xfrm>
           <a:prstGeom prst="rect">
             <a:avLst/>
@@ -5373,7 +5373,7 @@
           <a:p>
             <a:r>
               <a:rPr lang="en-IN" sz="1000" dirty="0"/>
-              <a:t>Similarity Search &amp; Filtering</a:t>
+              <a:t>Semantic Search &amp; Filtering</a:t>
             </a:r>
           </a:p>
         </p:txBody>

</xml_diff>